<commit_message>
Intermediate save before final cleaning
</commit_message>
<xml_diff>
--- a/powerpoint-drafts/aar2-degrowth-box-figures-and-meeting-notes.pptx
+++ b/powerpoint-drafts/aar2-degrowth-box-figures-and-meeting-notes.pptx
@@ -330,7 +330,7 @@
           <a:p>
             <a:fld id="{2B69D750-72AA-4B2F-AC6D-B9550E08088F}" type="datetimeFigureOut">
               <a:rPr lang="en-AT" smtClean="0"/>
-              <a:t>13/09/2023</a:t>
+              <a:t>09/16/2023</a:t>
             </a:fld>
             <a:endParaRPr lang="en-AT"/>
           </a:p>
@@ -530,7 +530,7 @@
           <a:p>
             <a:fld id="{2B69D750-72AA-4B2F-AC6D-B9550E08088F}" type="datetimeFigureOut">
               <a:rPr lang="en-AT" smtClean="0"/>
-              <a:t>13/09/2023</a:t>
+              <a:t>09/16/2023</a:t>
             </a:fld>
             <a:endParaRPr lang="en-AT"/>
           </a:p>
@@ -740,7 +740,7 @@
           <a:p>
             <a:fld id="{2B69D750-72AA-4B2F-AC6D-B9550E08088F}" type="datetimeFigureOut">
               <a:rPr lang="en-AT" smtClean="0"/>
-              <a:t>13/09/2023</a:t>
+              <a:t>09/16/2023</a:t>
             </a:fld>
             <a:endParaRPr lang="en-AT"/>
           </a:p>
@@ -940,7 +940,7 @@
           <a:p>
             <a:fld id="{2B69D750-72AA-4B2F-AC6D-B9550E08088F}" type="datetimeFigureOut">
               <a:rPr lang="en-AT" smtClean="0"/>
-              <a:t>13/09/2023</a:t>
+              <a:t>09/16/2023</a:t>
             </a:fld>
             <a:endParaRPr lang="en-AT"/>
           </a:p>
@@ -1216,7 +1216,7 @@
           <a:p>
             <a:fld id="{2B69D750-72AA-4B2F-AC6D-B9550E08088F}" type="datetimeFigureOut">
               <a:rPr lang="en-AT" smtClean="0"/>
-              <a:t>13/09/2023</a:t>
+              <a:t>09/16/2023</a:t>
             </a:fld>
             <a:endParaRPr lang="en-AT"/>
           </a:p>
@@ -1484,7 +1484,7 @@
           <a:p>
             <a:fld id="{2B69D750-72AA-4B2F-AC6D-B9550E08088F}" type="datetimeFigureOut">
               <a:rPr lang="en-AT" smtClean="0"/>
-              <a:t>13/09/2023</a:t>
+              <a:t>09/16/2023</a:t>
             </a:fld>
             <a:endParaRPr lang="en-AT"/>
           </a:p>
@@ -1899,7 +1899,7 @@
           <a:p>
             <a:fld id="{2B69D750-72AA-4B2F-AC6D-B9550E08088F}" type="datetimeFigureOut">
               <a:rPr lang="en-AT" smtClean="0"/>
-              <a:t>13/09/2023</a:t>
+              <a:t>09/16/2023</a:t>
             </a:fld>
             <a:endParaRPr lang="en-AT"/>
           </a:p>
@@ -2041,7 +2041,7 @@
           <a:p>
             <a:fld id="{2B69D750-72AA-4B2F-AC6D-B9550E08088F}" type="datetimeFigureOut">
               <a:rPr lang="en-AT" smtClean="0"/>
-              <a:t>13/09/2023</a:t>
+              <a:t>09/16/2023</a:t>
             </a:fld>
             <a:endParaRPr lang="en-AT"/>
           </a:p>
@@ -2154,7 +2154,7 @@
           <a:p>
             <a:fld id="{2B69D750-72AA-4B2F-AC6D-B9550E08088F}" type="datetimeFigureOut">
               <a:rPr lang="en-AT" smtClean="0"/>
-              <a:t>13/09/2023</a:t>
+              <a:t>09/16/2023</a:t>
             </a:fld>
             <a:endParaRPr lang="en-AT"/>
           </a:p>
@@ -2467,7 +2467,7 @@
           <a:p>
             <a:fld id="{2B69D750-72AA-4B2F-AC6D-B9550E08088F}" type="datetimeFigureOut">
               <a:rPr lang="en-AT" smtClean="0"/>
-              <a:t>13/09/2023</a:t>
+              <a:t>09/16/2023</a:t>
             </a:fld>
             <a:endParaRPr lang="en-AT"/>
           </a:p>
@@ -2756,7 +2756,7 @@
           <a:p>
             <a:fld id="{2B69D750-72AA-4B2F-AC6D-B9550E08088F}" type="datetimeFigureOut">
               <a:rPr lang="en-AT" smtClean="0"/>
-              <a:t>13/09/2023</a:t>
+              <a:t>09/16/2023</a:t>
             </a:fld>
             <a:endParaRPr lang="en-AT"/>
           </a:p>
@@ -2999,7 +2999,7 @@
           <a:p>
             <a:fld id="{2B69D750-72AA-4B2F-AC6D-B9550E08088F}" type="datetimeFigureOut">
               <a:rPr lang="en-AT" smtClean="0"/>
-              <a:t>13/09/2023</a:t>
+              <a:t>09/16/2023</a:t>
             </a:fld>
             <a:endParaRPr lang="en-AT"/>
           </a:p>
@@ -3443,52 +3443,14 @@
         </p:blipFill>
         <p:spPr>
           <a:xfrm>
-            <a:off x="6206088" y="3677001"/>
-            <a:ext cx="5213027" cy="3723365"/>
+            <a:off x="6206088" y="3698395"/>
+            <a:ext cx="5213027" cy="3492992"/>
           </a:xfrm>
           <a:prstGeom prst="rect">
             <a:avLst/>
           </a:prstGeom>
         </p:spPr>
       </p:pic>
-      <p:sp>
-        <p:nvSpPr>
-          <p:cNvPr id="8" name="TextBox 7">
-            <a:extLst>
-              <a:ext uri="{FF2B5EF4-FFF2-40B4-BE49-F238E27FC236}">
-                <a16:creationId xmlns:a16="http://schemas.microsoft.com/office/drawing/2014/main" id="{25351807-BDC2-CFE4-79D2-720C685C7588}"/>
-              </a:ext>
-            </a:extLst>
-          </p:cNvPr>
-          <p:cNvSpPr txBox="1"/>
-          <p:nvPr/>
-        </p:nvSpPr>
-        <p:spPr>
-          <a:xfrm>
-            <a:off x="6206088" y="-541407"/>
-            <a:ext cx="1819457" cy="307777"/>
-          </a:xfrm>
-          <a:prstGeom prst="rect">
-            <a:avLst/>
-          </a:prstGeom>
-          <a:noFill/>
-        </p:spPr>
-        <p:txBody>
-          <a:bodyPr wrap="square">
-            <a:spAutoFit/>
-          </a:bodyPr>
-          <a:lstStyle/>
-          <a:p>
-            <a:r>
-              <a:rPr lang="en-US" sz="1400" b="1" i="1" dirty="0">
-                <a:latin typeface="Calibri" panose="020F0502020204030204"/>
-              </a:rPr>
-              <a:t>E</a:t>
-            </a:r>
-            <a:endParaRPr lang="en-AT" sz="1400" dirty="0"/>
-          </a:p>
-        </p:txBody>
-      </p:sp>
       <p:sp>
         <p:nvSpPr>
           <p:cNvPr id="9" name="TextBox 8">
@@ -3555,8 +3517,8 @@
         </p:blipFill>
         <p:spPr>
           <a:xfrm>
-            <a:off x="6498771" y="-233630"/>
-            <a:ext cx="4920344" cy="3892003"/>
+            <a:off x="6676287" y="203525"/>
+            <a:ext cx="4367684" cy="3454848"/>
           </a:xfrm>
           <a:prstGeom prst="rect">
             <a:avLst/>
@@ -3745,6 +3707,44 @@
                 <a:latin typeface="Calibri" panose="020F0502020204030204"/>
               </a:rPr>
               <a:t>D</a:t>
+            </a:r>
+            <a:endParaRPr lang="en-AT" sz="1400" dirty="0"/>
+          </a:p>
+        </p:txBody>
+      </p:sp>
+      <p:sp>
+        <p:nvSpPr>
+          <p:cNvPr id="2" name="TextBox 1">
+            <a:extLst>
+              <a:ext uri="{FF2B5EF4-FFF2-40B4-BE49-F238E27FC236}">
+                <a16:creationId xmlns:a16="http://schemas.microsoft.com/office/drawing/2014/main" id="{796B1124-63D6-66D5-859D-EC3592D90993}"/>
+              </a:ext>
+            </a:extLst>
+          </p:cNvPr>
+          <p:cNvSpPr txBox="1"/>
+          <p:nvPr/>
+        </p:nvSpPr>
+        <p:spPr>
+          <a:xfrm>
+            <a:off x="6206088" y="470171"/>
+            <a:ext cx="2001430" cy="307777"/>
+          </a:xfrm>
+          <a:prstGeom prst="rect">
+            <a:avLst/>
+          </a:prstGeom>
+          <a:noFill/>
+        </p:spPr>
+        <p:txBody>
+          <a:bodyPr wrap="square">
+            <a:spAutoFit/>
+          </a:bodyPr>
+          <a:lstStyle/>
+          <a:p>
+            <a:r>
+              <a:rPr lang="en-US" sz="1400" b="1" i="1" dirty="0">
+                <a:latin typeface="Calibri" panose="020F0502020204030204"/>
+              </a:rPr>
+              <a:t>E</a:t>
             </a:r>
             <a:endParaRPr lang="en-AT" sz="1400" dirty="0"/>
           </a:p>
@@ -5104,10 +5104,10 @@
       </p:grpSpPr>
       <p:pic>
         <p:nvPicPr>
-          <p:cNvPr id="13" name="Picture 12">
-            <a:extLst>
-              <a:ext uri="{FF2B5EF4-FFF2-40B4-BE49-F238E27FC236}">
-                <a16:creationId xmlns:a16="http://schemas.microsoft.com/office/drawing/2014/main" id="{8D880704-F685-FEE9-9704-D87124552D84}"/>
+          <p:cNvPr id="11" name="Picture 10">
+            <a:extLst>
+              <a:ext uri="{FF2B5EF4-FFF2-40B4-BE49-F238E27FC236}">
+                <a16:creationId xmlns:a16="http://schemas.microsoft.com/office/drawing/2014/main" id="{9779201E-E6A4-AC83-26EF-3B32DF804F1E}"/>
               </a:ext>
             </a:extLst>
           </p:cNvPr>
@@ -5124,8 +5124,8 @@
         </p:blipFill>
         <p:spPr>
           <a:xfrm>
-            <a:off x="1003738" y="0"/>
-            <a:ext cx="10184524" cy="6858000"/>
+            <a:off x="302275" y="0"/>
+            <a:ext cx="11587449" cy="6858000"/>
           </a:xfrm>
           <a:prstGeom prst="rect">
             <a:avLst/>

</xml_diff>